<commit_message>
Updated architecture diagrams to use preferred format.
</commit_message>
<xml_diff>
--- a/docs/images/Architecture.pptx
+++ b/docs/images/Architecture.pptx
@@ -104,6 +104,11 @@
       </a:defRPr>
     </a:lvl9pPr>
   </p:defaultTextStyle>
+  <p:extLst>
+    <p:ext uri="{EFAFB233-063F-42B5-8137-9DF3F51BA10A}">
+      <p15:sldGuideLst xmlns:p15="http://schemas.microsoft.com/office/powerpoint/2012/main"/>
+    </p:ext>
+  </p:extLst>
 </p:presentation>
 </file>
 
@@ -3349,8 +3354,8 @@
         </p:blipFill>
         <p:spPr>
           <a:xfrm>
-            <a:off x="2904440" y="3211198"/>
-            <a:ext cx="952549" cy="952549"/>
+            <a:off x="4469206" y="2881135"/>
+            <a:ext cx="594360" cy="594360"/>
           </a:xfrm>
           <a:prstGeom prst="rect">
             <a:avLst/>
@@ -3385,8 +3390,8 @@
         </p:blipFill>
         <p:spPr>
           <a:xfrm>
-            <a:off x="1437788" y="3211203"/>
-            <a:ext cx="952549" cy="952549"/>
+            <a:off x="3104577" y="2839400"/>
+            <a:ext cx="594360" cy="594360"/>
           </a:xfrm>
           <a:prstGeom prst="rect">
             <a:avLst/>
@@ -3421,8 +3426,8 @@
         </p:blipFill>
         <p:spPr>
           <a:xfrm>
-            <a:off x="2904440" y="4706423"/>
-            <a:ext cx="952549" cy="952549"/>
+            <a:off x="4469206" y="4376360"/>
+            <a:ext cx="594360" cy="594360"/>
           </a:xfrm>
           <a:prstGeom prst="rect">
             <a:avLst/>
@@ -3457,8 +3462,8 @@
         </p:blipFill>
         <p:spPr>
           <a:xfrm>
-            <a:off x="8313099" y="4163747"/>
-            <a:ext cx="952549" cy="952549"/>
+            <a:off x="9167879" y="3746204"/>
+            <a:ext cx="594360" cy="594360"/>
           </a:xfrm>
           <a:prstGeom prst="rect">
             <a:avLst/>
@@ -3493,8 +3498,8 @@
         </p:blipFill>
         <p:spPr>
           <a:xfrm>
-            <a:off x="8313099" y="2455758"/>
-            <a:ext cx="952549" cy="952549"/>
+            <a:off x="9167879" y="2038215"/>
+            <a:ext cx="594360" cy="594360"/>
           </a:xfrm>
           <a:prstGeom prst="rect">
             <a:avLst/>
@@ -3529,691 +3534,20 @@
         </p:blipFill>
         <p:spPr>
           <a:xfrm>
-            <a:off x="4371092" y="3211198"/>
-            <a:ext cx="952549" cy="952549"/>
+            <a:off x="5935414" y="2881135"/>
+            <a:ext cx="594360" cy="594360"/>
           </a:xfrm>
           <a:prstGeom prst="rect">
             <a:avLst/>
           </a:prstGeom>
         </p:spPr>
       </p:pic>
-      <p:grpSp>
-        <p:nvGrpSpPr>
-          <p:cNvPr id="10" name="Group 9">
-            <a:extLst>
-              <a:ext uri="{FF2B5EF4-FFF2-40B4-BE49-F238E27FC236}">
-                <a16:creationId xmlns:a16="http://schemas.microsoft.com/office/drawing/2014/main" id="{F9EE8CF4-7190-1041-B1C7-BE3A0A7DF251}"/>
-              </a:ext>
-            </a:extLst>
-          </p:cNvPr>
-          <p:cNvGrpSpPr/>
-          <p:nvPr/>
-        </p:nvGrpSpPr>
-        <p:grpSpPr>
-          <a:xfrm>
-            <a:off x="1159042" y="1889322"/>
-            <a:ext cx="4481844" cy="2524598"/>
-            <a:chOff x="2824906" y="885628"/>
-            <a:chExt cx="4481844" cy="2524598"/>
-          </a:xfrm>
-        </p:grpSpPr>
-        <p:pic>
-          <p:nvPicPr>
-            <p:cNvPr id="11" name="Picture 10">
-              <a:extLst>
-                <a:ext uri="{FF2B5EF4-FFF2-40B4-BE49-F238E27FC236}">
-                  <a16:creationId xmlns:a16="http://schemas.microsoft.com/office/drawing/2014/main" id="{DE9BE6CB-2FD1-AD45-9FC1-4BAE8A500828}"/>
-                </a:ext>
-              </a:extLst>
-            </p:cNvPr>
-            <p:cNvPicPr>
-              <a:picLocks noChangeAspect="1"/>
-            </p:cNvPicPr>
-            <p:nvPr/>
-          </p:nvPicPr>
-          <p:blipFill>
-            <a:blip r:embed="rId7" cstate="print">
-              <a:extLst>
-                <a:ext uri="{28A0092B-C50C-407E-A947-70E740481C1C}">
-                  <a14:useLocalDpi xmlns:a14="http://schemas.microsoft.com/office/drawing/2010/main" val="0"/>
-                </a:ext>
-              </a:extLst>
-            </a:blip>
-            <a:stretch>
-              <a:fillRect/>
-            </a:stretch>
-          </p:blipFill>
-          <p:spPr>
-            <a:xfrm>
-              <a:off x="2824906" y="885628"/>
-              <a:ext cx="952549" cy="952549"/>
-            </a:xfrm>
-            <a:prstGeom prst="rect">
-              <a:avLst/>
-            </a:prstGeom>
-          </p:spPr>
-        </p:pic>
-        <p:sp>
-          <p:nvSpPr>
-            <p:cNvPr id="12" name="Rectangle 11">
-              <a:extLst>
-                <a:ext uri="{FF2B5EF4-FFF2-40B4-BE49-F238E27FC236}">
-                  <a16:creationId xmlns:a16="http://schemas.microsoft.com/office/drawing/2014/main" id="{770A4768-2035-0B43-BD9F-8D85CCA252F4}"/>
-                </a:ext>
-              </a:extLst>
-            </p:cNvPr>
-            <p:cNvSpPr/>
-            <p:nvPr/>
-          </p:nvSpPr>
-          <p:spPr>
-            <a:xfrm>
-              <a:off x="2824906" y="885628"/>
-              <a:ext cx="4481844" cy="2524598"/>
-            </a:xfrm>
-            <a:prstGeom prst="rect">
-              <a:avLst/>
-            </a:prstGeom>
-            <a:noFill/>
-            <a:ln>
-              <a:solidFill>
-                <a:schemeClr val="tx1"/>
-              </a:solidFill>
-            </a:ln>
-          </p:spPr>
-          <p:style>
-            <a:lnRef idx="2">
-              <a:schemeClr val="accent1">
-                <a:shade val="50000"/>
-              </a:schemeClr>
-            </a:lnRef>
-            <a:fillRef idx="1">
-              <a:schemeClr val="accent1"/>
-            </a:fillRef>
-            <a:effectRef idx="0">
-              <a:schemeClr val="accent1"/>
-            </a:effectRef>
-            <a:fontRef idx="minor">
-              <a:schemeClr val="lt1"/>
-            </a:fontRef>
-          </p:style>
-          <p:txBody>
-            <a:bodyPr rtlCol="0" anchor="ctr"/>
-            <a:lstStyle/>
-            <a:p>
-              <a:pPr algn="ctr"/>
-              <a:endParaRPr lang="en-US"/>
-            </a:p>
-          </p:txBody>
-        </p:sp>
-      </p:grpSp>
-      <p:sp>
-        <p:nvSpPr>
-          <p:cNvPr id="13" name="TextBox 12">
-            <a:extLst>
-              <a:ext uri="{FF2B5EF4-FFF2-40B4-BE49-F238E27FC236}">
-                <a16:creationId xmlns:a16="http://schemas.microsoft.com/office/drawing/2014/main" id="{E52C810B-E17B-A142-8DA4-1B33902BBE36}"/>
-              </a:ext>
-            </a:extLst>
-          </p:cNvPr>
-          <p:cNvSpPr txBox="1"/>
-          <p:nvPr/>
-        </p:nvSpPr>
-        <p:spPr>
-          <a:xfrm>
-            <a:off x="2622347" y="1519990"/>
-            <a:ext cx="1555234" cy="369332"/>
-          </a:xfrm>
-          <a:prstGeom prst="rect">
-            <a:avLst/>
-          </a:prstGeom>
-          <a:noFill/>
-        </p:spPr>
-        <p:txBody>
-          <a:bodyPr wrap="none" rtlCol="0">
-            <a:spAutoFit/>
-          </a:bodyPr>
-          <a:lstStyle/>
-          <a:p>
-            <a:r>
-              <a:rPr lang="en-US" dirty="0" err="1">
-                <a:latin typeface="Amazon Ember" panose="020B0603020204020204" pitchFamily="34" charset="0"/>
-                <a:ea typeface="Amazon Ember" panose="020B0603020204020204" pitchFamily="34" charset="0"/>
-                <a:cs typeface="Amazon Ember" panose="020B0603020204020204" pitchFamily="34" charset="0"/>
-              </a:rPr>
-              <a:t>CodePipeline</a:t>
-            </a:r>
-            <a:endParaRPr lang="en-US" dirty="0">
-              <a:latin typeface="Amazon Ember" panose="020B0603020204020204" pitchFamily="34" charset="0"/>
-              <a:ea typeface="Amazon Ember" panose="020B0603020204020204" pitchFamily="34" charset="0"/>
-              <a:cs typeface="Amazon Ember" panose="020B0603020204020204" pitchFamily="34" charset="0"/>
-            </a:endParaRPr>
-          </a:p>
-        </p:txBody>
-      </p:sp>
-      <p:sp>
-        <p:nvSpPr>
-          <p:cNvPr id="14" name="TextBox 13">
-            <a:extLst>
-              <a:ext uri="{FF2B5EF4-FFF2-40B4-BE49-F238E27FC236}">
-                <a16:creationId xmlns:a16="http://schemas.microsoft.com/office/drawing/2014/main" id="{796CDEDD-6830-4B49-B6BD-DA0F33100195}"/>
-              </a:ext>
-            </a:extLst>
-          </p:cNvPr>
-          <p:cNvSpPr txBox="1"/>
-          <p:nvPr/>
-        </p:nvSpPr>
-        <p:spPr>
-          <a:xfrm>
-            <a:off x="1457410" y="2951094"/>
-            <a:ext cx="952550" cy="246221"/>
-          </a:xfrm>
-          <a:prstGeom prst="rect">
-            <a:avLst/>
-          </a:prstGeom>
-          <a:noFill/>
-        </p:spPr>
-        <p:txBody>
-          <a:bodyPr wrap="square" rtlCol="0">
-            <a:spAutoFit/>
-          </a:bodyPr>
-          <a:lstStyle/>
-          <a:p>
-            <a:pPr algn="ctr"/>
-            <a:r>
-              <a:rPr lang="en-US" sz="1000" dirty="0" err="1">
-                <a:latin typeface="Amazon Ember" panose="020B0603020204020204" pitchFamily="34" charset="0"/>
-                <a:ea typeface="Amazon Ember" panose="020B0603020204020204" pitchFamily="34" charset="0"/>
-                <a:cs typeface="Amazon Ember" panose="020B0603020204020204" pitchFamily="34" charset="0"/>
-              </a:rPr>
-              <a:t>CodeCommit</a:t>
-            </a:r>
-            <a:endParaRPr lang="en-US" sz="1000" dirty="0">
-              <a:latin typeface="Amazon Ember" panose="020B0603020204020204" pitchFamily="34" charset="0"/>
-              <a:ea typeface="Amazon Ember" panose="020B0603020204020204" pitchFamily="34" charset="0"/>
-              <a:cs typeface="Amazon Ember" panose="020B0603020204020204" pitchFamily="34" charset="0"/>
-            </a:endParaRPr>
-          </a:p>
-        </p:txBody>
-      </p:sp>
-      <p:sp>
-        <p:nvSpPr>
-          <p:cNvPr id="15" name="TextBox 14">
-            <a:extLst>
-              <a:ext uri="{FF2B5EF4-FFF2-40B4-BE49-F238E27FC236}">
-                <a16:creationId xmlns:a16="http://schemas.microsoft.com/office/drawing/2014/main" id="{54CBB8B1-52C1-1D46-8084-ED0068262342}"/>
-              </a:ext>
-            </a:extLst>
-          </p:cNvPr>
-          <p:cNvSpPr txBox="1"/>
-          <p:nvPr/>
-        </p:nvSpPr>
-        <p:spPr>
-          <a:xfrm>
-            <a:off x="2904440" y="2801278"/>
-            <a:ext cx="952550" cy="400110"/>
-          </a:xfrm>
-          <a:prstGeom prst="rect">
-            <a:avLst/>
-          </a:prstGeom>
-          <a:noFill/>
-        </p:spPr>
-        <p:txBody>
-          <a:bodyPr wrap="square" rtlCol="0">
-            <a:spAutoFit/>
-          </a:bodyPr>
-          <a:lstStyle/>
-          <a:p>
-            <a:pPr algn="ctr"/>
-            <a:r>
-              <a:rPr lang="en-US" sz="1000" dirty="0" err="1">
-                <a:latin typeface="Amazon Ember" panose="020B0603020204020204" pitchFamily="34" charset="0"/>
-                <a:ea typeface="Amazon Ember" panose="020B0603020204020204" pitchFamily="34" charset="0"/>
-                <a:cs typeface="Amazon Ember" panose="020B0603020204020204" pitchFamily="34" charset="0"/>
-              </a:rPr>
-              <a:t>CodeBuild</a:t>
-            </a:r>
-            <a:endParaRPr lang="en-US" sz="1000" dirty="0">
-              <a:latin typeface="Amazon Ember" panose="020B0603020204020204" pitchFamily="34" charset="0"/>
-              <a:ea typeface="Amazon Ember" panose="020B0603020204020204" pitchFamily="34" charset="0"/>
-              <a:cs typeface="Amazon Ember" panose="020B0603020204020204" pitchFamily="34" charset="0"/>
-            </a:endParaRPr>
-          </a:p>
-          <a:p>
-            <a:pPr algn="ctr"/>
-            <a:r>
-              <a:rPr lang="en-US" sz="1000" dirty="0">
-                <a:latin typeface="Amazon Ember" panose="020B0603020204020204" pitchFamily="34" charset="0"/>
-                <a:ea typeface="Amazon Ember" panose="020B0603020204020204" pitchFamily="34" charset="0"/>
-                <a:cs typeface="Amazon Ember" panose="020B0603020204020204" pitchFamily="34" charset="0"/>
-              </a:rPr>
-              <a:t>SAM Build</a:t>
-            </a:r>
-          </a:p>
-        </p:txBody>
-      </p:sp>
-      <p:sp>
-        <p:nvSpPr>
-          <p:cNvPr id="16" name="TextBox 15">
-            <a:extLst>
-              <a:ext uri="{FF2B5EF4-FFF2-40B4-BE49-F238E27FC236}">
-                <a16:creationId xmlns:a16="http://schemas.microsoft.com/office/drawing/2014/main" id="{7D95D5B0-C76C-C14F-8696-CB796FA26354}"/>
-              </a:ext>
-            </a:extLst>
-          </p:cNvPr>
-          <p:cNvSpPr txBox="1"/>
-          <p:nvPr/>
-        </p:nvSpPr>
-        <p:spPr>
-          <a:xfrm>
-            <a:off x="2919272" y="5678595"/>
-            <a:ext cx="952550" cy="400110"/>
-          </a:xfrm>
-          <a:prstGeom prst="rect">
-            <a:avLst/>
-          </a:prstGeom>
-          <a:noFill/>
-        </p:spPr>
-        <p:txBody>
-          <a:bodyPr wrap="square" rtlCol="0">
-            <a:spAutoFit/>
-          </a:bodyPr>
-          <a:lstStyle/>
-          <a:p>
-            <a:pPr algn="ctr"/>
-            <a:r>
-              <a:rPr lang="en-US" sz="1000" dirty="0">
-                <a:latin typeface="Amazon Ember" panose="020B0603020204020204" pitchFamily="34" charset="0"/>
-                <a:ea typeface="Amazon Ember" panose="020B0603020204020204" pitchFamily="34" charset="0"/>
-                <a:cs typeface="Amazon Ember" panose="020B0603020204020204" pitchFamily="34" charset="0"/>
-              </a:rPr>
-              <a:t>Build</a:t>
-            </a:r>
-          </a:p>
-          <a:p>
-            <a:pPr algn="ctr"/>
-            <a:r>
-              <a:rPr lang="en-US" sz="1000" dirty="0">
-                <a:latin typeface="Amazon Ember" panose="020B0603020204020204" pitchFamily="34" charset="0"/>
-                <a:ea typeface="Amazon Ember" panose="020B0603020204020204" pitchFamily="34" charset="0"/>
-                <a:cs typeface="Amazon Ember" panose="020B0603020204020204" pitchFamily="34" charset="0"/>
-              </a:rPr>
-              <a:t>Artifacts</a:t>
-            </a:r>
-          </a:p>
-        </p:txBody>
-      </p:sp>
-      <p:sp>
-        <p:nvSpPr>
-          <p:cNvPr id="17" name="TextBox 16">
-            <a:extLst>
-              <a:ext uri="{FF2B5EF4-FFF2-40B4-BE49-F238E27FC236}">
-                <a16:creationId xmlns:a16="http://schemas.microsoft.com/office/drawing/2014/main" id="{F2C0577B-B6A2-7F42-95B0-F9AC3D421519}"/>
-              </a:ext>
-            </a:extLst>
-          </p:cNvPr>
-          <p:cNvSpPr txBox="1"/>
-          <p:nvPr/>
-        </p:nvSpPr>
-        <p:spPr>
-          <a:xfrm>
-            <a:off x="4371092" y="2797205"/>
-            <a:ext cx="952550" cy="400110"/>
-          </a:xfrm>
-          <a:prstGeom prst="rect">
-            <a:avLst/>
-          </a:prstGeom>
-          <a:noFill/>
-        </p:spPr>
-        <p:txBody>
-          <a:bodyPr wrap="square" rtlCol="0">
-            <a:spAutoFit/>
-          </a:bodyPr>
-          <a:lstStyle/>
-          <a:p>
-            <a:pPr algn="ctr"/>
-            <a:r>
-              <a:rPr lang="en-US" sz="1000" dirty="0" err="1">
-                <a:latin typeface="Amazon Ember" panose="020B0603020204020204" pitchFamily="34" charset="0"/>
-                <a:ea typeface="Amazon Ember" panose="020B0603020204020204" pitchFamily="34" charset="0"/>
-                <a:cs typeface="Amazon Ember" panose="020B0603020204020204" pitchFamily="34" charset="0"/>
-              </a:rPr>
-              <a:t>CodeBuild</a:t>
-            </a:r>
-            <a:endParaRPr lang="en-US" sz="1000" dirty="0">
-              <a:latin typeface="Amazon Ember" panose="020B0603020204020204" pitchFamily="34" charset="0"/>
-              <a:ea typeface="Amazon Ember" panose="020B0603020204020204" pitchFamily="34" charset="0"/>
-              <a:cs typeface="Amazon Ember" panose="020B0603020204020204" pitchFamily="34" charset="0"/>
-            </a:endParaRPr>
-          </a:p>
-          <a:p>
-            <a:pPr algn="ctr"/>
-            <a:r>
-              <a:rPr lang="en-US" sz="1000" dirty="0">
-                <a:latin typeface="Amazon Ember" panose="020B0603020204020204" pitchFamily="34" charset="0"/>
-                <a:ea typeface="Amazon Ember" panose="020B0603020204020204" pitchFamily="34" charset="0"/>
-                <a:cs typeface="Amazon Ember" panose="020B0603020204020204" pitchFamily="34" charset="0"/>
-              </a:rPr>
-              <a:t>SAM Deploy</a:t>
-            </a:r>
-          </a:p>
-        </p:txBody>
-      </p:sp>
-      <p:sp>
-        <p:nvSpPr>
-          <p:cNvPr id="18" name="TextBox 17">
-            <a:extLst>
-              <a:ext uri="{FF2B5EF4-FFF2-40B4-BE49-F238E27FC236}">
-                <a16:creationId xmlns:a16="http://schemas.microsoft.com/office/drawing/2014/main" id="{36628813-EEFA-6345-B6C8-6B39667182A7}"/>
-              </a:ext>
-            </a:extLst>
-          </p:cNvPr>
-          <p:cNvSpPr txBox="1"/>
-          <p:nvPr/>
-        </p:nvSpPr>
-        <p:spPr>
-          <a:xfrm>
-            <a:off x="8313098" y="2183620"/>
-            <a:ext cx="952550" cy="246221"/>
-          </a:xfrm>
-          <a:prstGeom prst="rect">
-            <a:avLst/>
-          </a:prstGeom>
-          <a:noFill/>
-        </p:spPr>
-        <p:txBody>
-          <a:bodyPr wrap="square" rtlCol="0">
-            <a:spAutoFit/>
-          </a:bodyPr>
-          <a:lstStyle/>
-          <a:p>
-            <a:pPr algn="ctr"/>
-            <a:r>
-              <a:rPr lang="en-US" sz="1000" dirty="0">
-                <a:latin typeface="Amazon Ember" panose="020B0603020204020204" pitchFamily="34" charset="0"/>
-                <a:ea typeface="Amazon Ember" panose="020B0603020204020204" pitchFamily="34" charset="0"/>
-                <a:cs typeface="Amazon Ember" panose="020B0603020204020204" pitchFamily="34" charset="0"/>
-              </a:rPr>
-              <a:t>API Gateway</a:t>
-            </a:r>
-          </a:p>
-        </p:txBody>
-      </p:sp>
-      <p:sp>
-        <p:nvSpPr>
-          <p:cNvPr id="19" name="TextBox 18">
-            <a:extLst>
-              <a:ext uri="{FF2B5EF4-FFF2-40B4-BE49-F238E27FC236}">
-                <a16:creationId xmlns:a16="http://schemas.microsoft.com/office/drawing/2014/main" id="{AF44D635-DD13-C84C-BF5B-700B2611883D}"/>
-              </a:ext>
-            </a:extLst>
-          </p:cNvPr>
-          <p:cNvSpPr txBox="1"/>
-          <p:nvPr/>
-        </p:nvSpPr>
-        <p:spPr>
-          <a:xfrm>
-            <a:off x="8313097" y="3889654"/>
-            <a:ext cx="952550" cy="246221"/>
-          </a:xfrm>
-          <a:prstGeom prst="rect">
-            <a:avLst/>
-          </a:prstGeom>
-          <a:noFill/>
-        </p:spPr>
-        <p:txBody>
-          <a:bodyPr wrap="square" rtlCol="0">
-            <a:spAutoFit/>
-          </a:bodyPr>
-          <a:lstStyle/>
-          <a:p>
-            <a:pPr algn="ctr"/>
-            <a:r>
-              <a:rPr lang="en-US" sz="1000" dirty="0">
-                <a:latin typeface="Amazon Ember" panose="020B0603020204020204" pitchFamily="34" charset="0"/>
-                <a:ea typeface="Amazon Ember" panose="020B0603020204020204" pitchFamily="34" charset="0"/>
-                <a:cs typeface="Amazon Ember" panose="020B0603020204020204" pitchFamily="34" charset="0"/>
-              </a:rPr>
-              <a:t>Lambda</a:t>
-            </a:r>
-          </a:p>
-        </p:txBody>
-      </p:sp>
-      <p:sp>
-        <p:nvSpPr>
-          <p:cNvPr id="20" name="Right Arrow 19">
-            <a:extLst>
-              <a:ext uri="{FF2B5EF4-FFF2-40B4-BE49-F238E27FC236}">
-                <a16:creationId xmlns:a16="http://schemas.microsoft.com/office/drawing/2014/main" id="{6046ED90-F0C5-5F44-B27E-5B60178A95F9}"/>
-              </a:ext>
-            </a:extLst>
-          </p:cNvPr>
-          <p:cNvSpPr/>
-          <p:nvPr/>
-        </p:nvSpPr>
-        <p:spPr>
-          <a:xfrm>
-            <a:off x="2511912" y="3594708"/>
-            <a:ext cx="318052" cy="185531"/>
-          </a:xfrm>
-          <a:prstGeom prst="rightArrow">
-            <a:avLst/>
-          </a:prstGeom>
-        </p:spPr>
-        <p:style>
-          <a:lnRef idx="2">
-            <a:schemeClr val="accent1">
-              <a:shade val="50000"/>
-            </a:schemeClr>
-          </a:lnRef>
-          <a:fillRef idx="1">
-            <a:schemeClr val="accent1"/>
-          </a:fillRef>
-          <a:effectRef idx="0">
-            <a:schemeClr val="accent1"/>
-          </a:effectRef>
-          <a:fontRef idx="minor">
-            <a:schemeClr val="lt1"/>
-          </a:fontRef>
-        </p:style>
-        <p:txBody>
-          <a:bodyPr rtlCol="0" anchor="ctr"/>
-          <a:lstStyle/>
-          <a:p>
-            <a:pPr algn="ctr"/>
-            <a:endParaRPr lang="en-US"/>
-          </a:p>
-        </p:txBody>
-      </p:sp>
-      <p:sp>
-        <p:nvSpPr>
-          <p:cNvPr id="21" name="Right Arrow 20">
-            <a:extLst>
-              <a:ext uri="{FF2B5EF4-FFF2-40B4-BE49-F238E27FC236}">
-                <a16:creationId xmlns:a16="http://schemas.microsoft.com/office/drawing/2014/main" id="{99254299-B797-504D-AFC3-E8A7BCD60B09}"/>
-              </a:ext>
-            </a:extLst>
-          </p:cNvPr>
-          <p:cNvSpPr/>
-          <p:nvPr/>
-        </p:nvSpPr>
-        <p:spPr>
-          <a:xfrm>
-            <a:off x="3993397" y="3594707"/>
-            <a:ext cx="318052" cy="185531"/>
-          </a:xfrm>
-          <a:prstGeom prst="rightArrow">
-            <a:avLst/>
-          </a:prstGeom>
-        </p:spPr>
-        <p:style>
-          <a:lnRef idx="2">
-            <a:schemeClr val="accent1">
-              <a:shade val="50000"/>
-            </a:schemeClr>
-          </a:lnRef>
-          <a:fillRef idx="1">
-            <a:schemeClr val="accent1"/>
-          </a:fillRef>
-          <a:effectRef idx="0">
-            <a:schemeClr val="accent1"/>
-          </a:effectRef>
-          <a:fontRef idx="minor">
-            <a:schemeClr val="lt1"/>
-          </a:fontRef>
-        </p:style>
-        <p:txBody>
-          <a:bodyPr rtlCol="0" anchor="ctr"/>
-          <a:lstStyle/>
-          <a:p>
-            <a:pPr algn="ctr"/>
-            <a:endParaRPr lang="en-US"/>
-          </a:p>
-        </p:txBody>
-      </p:sp>
-      <p:sp>
-        <p:nvSpPr>
-          <p:cNvPr id="22" name="Right Arrow 21">
-            <a:extLst>
-              <a:ext uri="{FF2B5EF4-FFF2-40B4-BE49-F238E27FC236}">
-                <a16:creationId xmlns:a16="http://schemas.microsoft.com/office/drawing/2014/main" id="{B8D0698E-9E07-0441-88A0-4748B8E8AECD}"/>
-              </a:ext>
-            </a:extLst>
-          </p:cNvPr>
-          <p:cNvSpPr/>
-          <p:nvPr/>
-        </p:nvSpPr>
-        <p:spPr>
-          <a:xfrm>
-            <a:off x="5481456" y="3594707"/>
-            <a:ext cx="614543" cy="185531"/>
-          </a:xfrm>
-          <a:prstGeom prst="rightArrow">
-            <a:avLst/>
-          </a:prstGeom>
-        </p:spPr>
-        <p:style>
-          <a:lnRef idx="2">
-            <a:schemeClr val="accent1">
-              <a:shade val="50000"/>
-            </a:schemeClr>
-          </a:lnRef>
-          <a:fillRef idx="1">
-            <a:schemeClr val="accent1"/>
-          </a:fillRef>
-          <a:effectRef idx="0">
-            <a:schemeClr val="accent1"/>
-          </a:effectRef>
-          <a:fontRef idx="minor">
-            <a:schemeClr val="lt1"/>
-          </a:fontRef>
-        </p:style>
-        <p:txBody>
-          <a:bodyPr rtlCol="0" anchor="ctr"/>
-          <a:lstStyle/>
-          <a:p>
-            <a:pPr algn="ctr"/>
-            <a:endParaRPr lang="en-US"/>
-          </a:p>
-        </p:txBody>
-      </p:sp>
-      <p:sp>
-        <p:nvSpPr>
-          <p:cNvPr id="23" name="Down Arrow 22">
-            <a:extLst>
-              <a:ext uri="{FF2B5EF4-FFF2-40B4-BE49-F238E27FC236}">
-                <a16:creationId xmlns:a16="http://schemas.microsoft.com/office/drawing/2014/main" id="{96E98898-FA6D-3047-B335-C40BB8B54848}"/>
-              </a:ext>
-            </a:extLst>
-          </p:cNvPr>
-          <p:cNvSpPr/>
-          <p:nvPr/>
-        </p:nvSpPr>
-        <p:spPr>
-          <a:xfrm>
-            <a:off x="3309408" y="4224806"/>
-            <a:ext cx="172278" cy="450574"/>
-          </a:xfrm>
-          <a:prstGeom prst="downArrow">
-            <a:avLst/>
-          </a:prstGeom>
-        </p:spPr>
-        <p:style>
-          <a:lnRef idx="2">
-            <a:schemeClr val="accent1">
-              <a:shade val="50000"/>
-            </a:schemeClr>
-          </a:lnRef>
-          <a:fillRef idx="1">
-            <a:schemeClr val="accent1"/>
-          </a:fillRef>
-          <a:effectRef idx="0">
-            <a:schemeClr val="accent1"/>
-          </a:effectRef>
-          <a:fontRef idx="minor">
-            <a:schemeClr val="lt1"/>
-          </a:fontRef>
-        </p:style>
-        <p:txBody>
-          <a:bodyPr rtlCol="0" anchor="ctr"/>
-          <a:lstStyle/>
-          <a:p>
-            <a:pPr algn="ctr"/>
-            <a:endParaRPr lang="en-US"/>
-          </a:p>
-        </p:txBody>
-      </p:sp>
-      <p:sp>
-        <p:nvSpPr>
-          <p:cNvPr id="24" name="Right Arrow 23">
-            <a:extLst>
-              <a:ext uri="{FF2B5EF4-FFF2-40B4-BE49-F238E27FC236}">
-                <a16:creationId xmlns:a16="http://schemas.microsoft.com/office/drawing/2014/main" id="{4D5591C4-3D3D-DB49-BABC-A9ACC526A401}"/>
-              </a:ext>
-            </a:extLst>
-          </p:cNvPr>
-          <p:cNvSpPr/>
-          <p:nvPr/>
-        </p:nvSpPr>
-        <p:spPr>
-          <a:xfrm rot="18865703">
-            <a:off x="3838430" y="4376220"/>
-            <a:ext cx="653774" cy="181113"/>
-          </a:xfrm>
-          <a:prstGeom prst="rightArrow">
-            <a:avLst/>
-          </a:prstGeom>
-        </p:spPr>
-        <p:style>
-          <a:lnRef idx="2">
-            <a:schemeClr val="accent1">
-              <a:shade val="50000"/>
-            </a:schemeClr>
-          </a:lnRef>
-          <a:fillRef idx="1">
-            <a:schemeClr val="accent1"/>
-          </a:fillRef>
-          <a:effectRef idx="0">
-            <a:schemeClr val="accent1"/>
-          </a:effectRef>
-          <a:fontRef idx="minor">
-            <a:schemeClr val="lt1"/>
-          </a:fontRef>
-        </p:style>
-        <p:txBody>
-          <a:bodyPr rtlCol="0" anchor="ctr"/>
-          <a:lstStyle/>
-          <a:p>
-            <a:pPr algn="ctr"/>
-            <a:endParaRPr lang="en-US"/>
-          </a:p>
-        </p:txBody>
-      </p:sp>
       <p:pic>
         <p:nvPicPr>
-          <p:cNvPr id="25" name="Picture 24">
-            <a:extLst>
-              <a:ext uri="{FF2B5EF4-FFF2-40B4-BE49-F238E27FC236}">
-                <a16:creationId xmlns:a16="http://schemas.microsoft.com/office/drawing/2014/main" id="{7D92B999-0E4E-284F-AC7D-3954E485EADB}"/>
+          <p:cNvPr id="11" name="Picture 10">
+            <a:extLst>
+              <a:ext uri="{FF2B5EF4-FFF2-40B4-BE49-F238E27FC236}">
+                <a16:creationId xmlns:a16="http://schemas.microsoft.com/office/drawing/2014/main" id="{DE9BE6CB-2FD1-AD45-9FC1-4BAE8A500828}"/>
               </a:ext>
             </a:extLst>
           </p:cNvPr>
@@ -4223,7 +3557,7 @@
           <p:nvPr/>
         </p:nvPicPr>
         <p:blipFill>
-          <a:blip r:embed="rId8">
+          <a:blip r:embed="rId7" cstate="print">
             <a:extLst>
               <a:ext uri="{28A0092B-C50C-407E-A947-70E740481C1C}">
                 <a14:useLocalDpi xmlns:a14="http://schemas.microsoft.com/office/drawing/2010/main" val="0"/>
@@ -4236,8 +3570,8 @@
         </p:blipFill>
         <p:spPr>
           <a:xfrm>
-            <a:off x="6253814" y="3211247"/>
-            <a:ext cx="952500" cy="952500"/>
+            <a:off x="2723808" y="1559259"/>
+            <a:ext cx="594360" cy="594360"/>
           </a:xfrm>
           <a:prstGeom prst="rect">
             <a:avLst/>
@@ -4246,148 +3580,20 @@
       </p:pic>
       <p:sp>
         <p:nvSpPr>
-          <p:cNvPr id="26" name="TextBox 25">
-            <a:extLst>
-              <a:ext uri="{FF2B5EF4-FFF2-40B4-BE49-F238E27FC236}">
-                <a16:creationId xmlns:a16="http://schemas.microsoft.com/office/drawing/2014/main" id="{98FF08B6-15AE-7442-8B9D-9D79650859EF}"/>
-              </a:ext>
-            </a:extLst>
-          </p:cNvPr>
-          <p:cNvSpPr txBox="1"/>
+          <p:cNvPr id="12" name="Rectangle 11">
+            <a:extLst>
+              <a:ext uri="{FF2B5EF4-FFF2-40B4-BE49-F238E27FC236}">
+                <a16:creationId xmlns:a16="http://schemas.microsoft.com/office/drawing/2014/main" id="{770A4768-2035-0B43-BD9F-8D85CCA252F4}"/>
+              </a:ext>
+            </a:extLst>
+          </p:cNvPr>
+          <p:cNvSpPr/>
           <p:nvPr/>
         </p:nvSpPr>
         <p:spPr>
           <a:xfrm>
-            <a:off x="6144497" y="2926042"/>
-            <a:ext cx="1132520" cy="246221"/>
-          </a:xfrm>
-          <a:prstGeom prst="rect">
-            <a:avLst/>
-          </a:prstGeom>
-          <a:noFill/>
-        </p:spPr>
-        <p:txBody>
-          <a:bodyPr wrap="square" rtlCol="0">
-            <a:spAutoFit/>
-          </a:bodyPr>
-          <a:lstStyle/>
-          <a:p>
-            <a:pPr algn="ctr"/>
-            <a:r>
-              <a:rPr lang="en-US" sz="1000" dirty="0">
-                <a:latin typeface="Amazon Ember" panose="020B0603020204020204" pitchFamily="34" charset="0"/>
-                <a:ea typeface="Amazon Ember" panose="020B0603020204020204" pitchFamily="34" charset="0"/>
-                <a:cs typeface="Amazon Ember" panose="020B0603020204020204" pitchFamily="34" charset="0"/>
-              </a:rPr>
-              <a:t>CloudFormation</a:t>
-            </a:r>
-          </a:p>
-        </p:txBody>
-      </p:sp>
-      <p:sp>
-        <p:nvSpPr>
-          <p:cNvPr id="27" name="Right Arrow 26">
-            <a:extLst>
-              <a:ext uri="{FF2B5EF4-FFF2-40B4-BE49-F238E27FC236}">
-                <a16:creationId xmlns:a16="http://schemas.microsoft.com/office/drawing/2014/main" id="{F413C636-4CD0-A248-952C-41D648A60CEF}"/>
-              </a:ext>
-            </a:extLst>
-          </p:cNvPr>
-          <p:cNvSpPr/>
-          <p:nvPr/>
-        </p:nvSpPr>
-        <p:spPr>
-          <a:xfrm>
-            <a:off x="7452435" y="3416006"/>
-            <a:ext cx="614543" cy="566110"/>
-          </a:xfrm>
-          <a:prstGeom prst="rightArrow">
-            <a:avLst/>
-          </a:prstGeom>
-        </p:spPr>
-        <p:style>
-          <a:lnRef idx="2">
-            <a:schemeClr val="accent1">
-              <a:shade val="50000"/>
-            </a:schemeClr>
-          </a:lnRef>
-          <a:fillRef idx="1">
-            <a:schemeClr val="accent1"/>
-          </a:fillRef>
-          <a:effectRef idx="0">
-            <a:schemeClr val="accent1"/>
-          </a:effectRef>
-          <a:fontRef idx="minor">
-            <a:schemeClr val="lt1"/>
-          </a:fontRef>
-        </p:style>
-        <p:txBody>
-          <a:bodyPr rtlCol="0" anchor="ctr"/>
-          <a:lstStyle/>
-          <a:p>
-            <a:pPr algn="ctr"/>
-            <a:endParaRPr lang="en-US"/>
-          </a:p>
-        </p:txBody>
-      </p:sp>
-      <p:cxnSp>
-        <p:nvCxnSpPr>
-          <p:cNvPr id="28" name="Straight Arrow Connector 27">
-            <a:extLst>
-              <a:ext uri="{FF2B5EF4-FFF2-40B4-BE49-F238E27FC236}">
-                <a16:creationId xmlns:a16="http://schemas.microsoft.com/office/drawing/2014/main" id="{F77A0213-0295-114B-9520-40B0EE467205}"/>
-              </a:ext>
-            </a:extLst>
-          </p:cNvPr>
-          <p:cNvCxnSpPr>
-            <a:stCxn id="8" idx="2"/>
-            <a:endCxn id="19" idx="2"/>
-          </p:cNvCxnSpPr>
-          <p:nvPr/>
-        </p:nvCxnSpPr>
-        <p:spPr>
-          <a:xfrm flipH="1">
-            <a:off x="8789372" y="3408307"/>
-            <a:ext cx="2" cy="727568"/>
-          </a:xfrm>
-          <a:prstGeom prst="straightConnector1">
-            <a:avLst/>
-          </a:prstGeom>
-          <a:ln>
-            <a:tailEnd type="triangle"/>
-          </a:ln>
-        </p:spPr>
-        <p:style>
-          <a:lnRef idx="3">
-            <a:schemeClr val="accent1"/>
-          </a:lnRef>
-          <a:fillRef idx="0">
-            <a:schemeClr val="accent1"/>
-          </a:fillRef>
-          <a:effectRef idx="2">
-            <a:schemeClr val="accent1"/>
-          </a:effectRef>
-          <a:fontRef idx="minor">
-            <a:schemeClr val="tx1"/>
-          </a:fontRef>
-        </p:style>
-      </p:cxnSp>
-      <p:sp>
-        <p:nvSpPr>
-          <p:cNvPr id="29" name="Rectangle 28">
-            <a:extLst>
-              <a:ext uri="{FF2B5EF4-FFF2-40B4-BE49-F238E27FC236}">
-                <a16:creationId xmlns:a16="http://schemas.microsoft.com/office/drawing/2014/main" id="{863B7578-14C3-FB4D-B01A-0D5DFEFD4A37}"/>
-              </a:ext>
-            </a:extLst>
-          </p:cNvPr>
-          <p:cNvSpPr/>
-          <p:nvPr/>
-        </p:nvSpPr>
-        <p:spPr>
-          <a:xfrm>
-            <a:off x="685800" y="779295"/>
-            <a:ext cx="10172700" cy="5405606"/>
+            <a:off x="2723808" y="1559259"/>
+            <a:ext cx="4481844" cy="2524598"/>
           </a:xfrm>
           <a:prstGeom prst="rect">
             <a:avLst/>
@@ -4424,6 +3630,466 @@
           </a:p>
         </p:txBody>
       </p:sp>
+      <p:sp>
+        <p:nvSpPr>
+          <p:cNvPr id="13" name="TextBox 12">
+            <a:extLst>
+              <a:ext uri="{FF2B5EF4-FFF2-40B4-BE49-F238E27FC236}">
+                <a16:creationId xmlns:a16="http://schemas.microsoft.com/office/drawing/2014/main" id="{E52C810B-E17B-A142-8DA4-1B33902BBE36}"/>
+              </a:ext>
+            </a:extLst>
+          </p:cNvPr>
+          <p:cNvSpPr txBox="1"/>
+          <p:nvPr/>
+        </p:nvSpPr>
+        <p:spPr>
+          <a:xfrm>
+            <a:off x="3301625" y="1580728"/>
+            <a:ext cx="1250663" cy="307777"/>
+          </a:xfrm>
+          <a:prstGeom prst="rect">
+            <a:avLst/>
+          </a:prstGeom>
+          <a:noFill/>
+        </p:spPr>
+        <p:txBody>
+          <a:bodyPr wrap="none" rtlCol="0">
+            <a:spAutoFit/>
+          </a:bodyPr>
+          <a:lstStyle/>
+          <a:p>
+            <a:r>
+              <a:rPr lang="en-US" sz="1400" dirty="0" err="1">
+                <a:latin typeface="Arial" panose="020B0604020202020204" pitchFamily="34" charset="0"/>
+                <a:ea typeface="Amazon Ember" panose="020B0603020204020204" pitchFamily="34" charset="0"/>
+                <a:cs typeface="Arial" panose="020B0604020202020204" pitchFamily="34" charset="0"/>
+              </a:rPr>
+              <a:t>CodePipeline</a:t>
+            </a:r>
+            <a:endParaRPr lang="en-US" sz="1400" dirty="0">
+              <a:latin typeface="Arial" panose="020B0604020202020204" pitchFamily="34" charset="0"/>
+              <a:ea typeface="Amazon Ember" panose="020B0603020204020204" pitchFamily="34" charset="0"/>
+              <a:cs typeface="Arial" panose="020B0604020202020204" pitchFamily="34" charset="0"/>
+            </a:endParaRPr>
+          </a:p>
+        </p:txBody>
+      </p:sp>
+      <p:sp>
+        <p:nvSpPr>
+          <p:cNvPr id="14" name="TextBox 13">
+            <a:extLst>
+              <a:ext uri="{FF2B5EF4-FFF2-40B4-BE49-F238E27FC236}">
+                <a16:creationId xmlns:a16="http://schemas.microsoft.com/office/drawing/2014/main" id="{796CDEDD-6830-4B49-B6BD-DA0F33100195}"/>
+              </a:ext>
+            </a:extLst>
+          </p:cNvPr>
+          <p:cNvSpPr txBox="1"/>
+          <p:nvPr/>
+        </p:nvSpPr>
+        <p:spPr>
+          <a:xfrm>
+            <a:off x="2767718" y="2508020"/>
+            <a:ext cx="1229514" cy="307777"/>
+          </a:xfrm>
+          <a:prstGeom prst="rect">
+            <a:avLst/>
+          </a:prstGeom>
+          <a:noFill/>
+        </p:spPr>
+        <p:txBody>
+          <a:bodyPr wrap="square" rtlCol="0">
+            <a:spAutoFit/>
+          </a:bodyPr>
+          <a:lstStyle/>
+          <a:p>
+            <a:pPr algn="ctr"/>
+            <a:r>
+              <a:rPr lang="en-US" sz="1400" dirty="0" err="1">
+                <a:latin typeface="Arial" panose="020B0604020202020204" pitchFamily="34" charset="0"/>
+                <a:ea typeface="Amazon Ember" panose="020B0603020204020204" pitchFamily="34" charset="0"/>
+                <a:cs typeface="Arial" panose="020B0604020202020204" pitchFamily="34" charset="0"/>
+              </a:rPr>
+              <a:t>CodeCommit</a:t>
+            </a:r>
+            <a:endParaRPr lang="en-US" sz="1400" dirty="0">
+              <a:latin typeface="Arial" panose="020B0604020202020204" pitchFamily="34" charset="0"/>
+              <a:ea typeface="Amazon Ember" panose="020B0603020204020204" pitchFamily="34" charset="0"/>
+              <a:cs typeface="Arial" panose="020B0604020202020204" pitchFamily="34" charset="0"/>
+            </a:endParaRPr>
+          </a:p>
+        </p:txBody>
+      </p:sp>
+      <p:sp>
+        <p:nvSpPr>
+          <p:cNvPr id="15" name="TextBox 14">
+            <a:extLst>
+              <a:ext uri="{FF2B5EF4-FFF2-40B4-BE49-F238E27FC236}">
+                <a16:creationId xmlns:a16="http://schemas.microsoft.com/office/drawing/2014/main" id="{54CBB8B1-52C1-1D46-8084-ED0068262342}"/>
+              </a:ext>
+            </a:extLst>
+          </p:cNvPr>
+          <p:cNvSpPr txBox="1"/>
+          <p:nvPr/>
+        </p:nvSpPr>
+        <p:spPr>
+          <a:xfrm>
+            <a:off x="4151629" y="2298338"/>
+            <a:ext cx="1229513" cy="523220"/>
+          </a:xfrm>
+          <a:prstGeom prst="rect">
+            <a:avLst/>
+          </a:prstGeom>
+          <a:noFill/>
+        </p:spPr>
+        <p:txBody>
+          <a:bodyPr wrap="square" rtlCol="0">
+            <a:spAutoFit/>
+          </a:bodyPr>
+          <a:lstStyle/>
+          <a:p>
+            <a:pPr algn="ctr"/>
+            <a:r>
+              <a:rPr lang="en-US" sz="1400" dirty="0" err="1">
+                <a:latin typeface="Arial" panose="020B0604020202020204" pitchFamily="34" charset="0"/>
+                <a:ea typeface="Amazon Ember" panose="020B0603020204020204" pitchFamily="34" charset="0"/>
+                <a:cs typeface="Arial" panose="020B0604020202020204" pitchFamily="34" charset="0"/>
+              </a:rPr>
+              <a:t>CodeBuild</a:t>
+            </a:r>
+            <a:endParaRPr lang="en-US" sz="1400" dirty="0">
+              <a:latin typeface="Arial" panose="020B0604020202020204" pitchFamily="34" charset="0"/>
+              <a:ea typeface="Amazon Ember" panose="020B0603020204020204" pitchFamily="34" charset="0"/>
+              <a:cs typeface="Arial" panose="020B0604020202020204" pitchFamily="34" charset="0"/>
+            </a:endParaRPr>
+          </a:p>
+          <a:p>
+            <a:pPr algn="ctr"/>
+            <a:r>
+              <a:rPr lang="en-US" sz="1400" dirty="0">
+                <a:latin typeface="Arial" panose="020B0604020202020204" pitchFamily="34" charset="0"/>
+                <a:ea typeface="Amazon Ember" panose="020B0603020204020204" pitchFamily="34" charset="0"/>
+                <a:cs typeface="Arial" panose="020B0604020202020204" pitchFamily="34" charset="0"/>
+              </a:rPr>
+              <a:t>SAM Build</a:t>
+            </a:r>
+          </a:p>
+        </p:txBody>
+      </p:sp>
+      <p:sp>
+        <p:nvSpPr>
+          <p:cNvPr id="16" name="TextBox 15">
+            <a:extLst>
+              <a:ext uri="{FF2B5EF4-FFF2-40B4-BE49-F238E27FC236}">
+                <a16:creationId xmlns:a16="http://schemas.microsoft.com/office/drawing/2014/main" id="{7D95D5B0-C76C-C14F-8696-CB796FA26354}"/>
+              </a:ext>
+            </a:extLst>
+          </p:cNvPr>
+          <p:cNvSpPr txBox="1"/>
+          <p:nvPr/>
+        </p:nvSpPr>
+        <p:spPr>
+          <a:xfrm>
+            <a:off x="4290110" y="5020703"/>
+            <a:ext cx="952550" cy="523220"/>
+          </a:xfrm>
+          <a:prstGeom prst="rect">
+            <a:avLst/>
+          </a:prstGeom>
+          <a:noFill/>
+        </p:spPr>
+        <p:txBody>
+          <a:bodyPr wrap="square" rtlCol="0">
+            <a:spAutoFit/>
+          </a:bodyPr>
+          <a:lstStyle/>
+          <a:p>
+            <a:pPr algn="ctr"/>
+            <a:r>
+              <a:rPr lang="en-US" sz="1400" dirty="0">
+                <a:latin typeface="Arial" panose="020B0604020202020204" pitchFamily="34" charset="0"/>
+                <a:ea typeface="Amazon Ember" panose="020B0603020204020204" pitchFamily="34" charset="0"/>
+                <a:cs typeface="Arial" panose="020B0604020202020204" pitchFamily="34" charset="0"/>
+              </a:rPr>
+              <a:t>S3 Build</a:t>
+            </a:r>
+          </a:p>
+          <a:p>
+            <a:pPr algn="ctr"/>
+            <a:r>
+              <a:rPr lang="en-US" sz="1400" dirty="0">
+                <a:latin typeface="Arial" panose="020B0604020202020204" pitchFamily="34" charset="0"/>
+                <a:ea typeface="Amazon Ember" panose="020B0603020204020204" pitchFamily="34" charset="0"/>
+                <a:cs typeface="Arial" panose="020B0604020202020204" pitchFamily="34" charset="0"/>
+              </a:rPr>
+              <a:t>Artifacts</a:t>
+            </a:r>
+          </a:p>
+        </p:txBody>
+      </p:sp>
+      <p:sp>
+        <p:nvSpPr>
+          <p:cNvPr id="17" name="TextBox 16">
+            <a:extLst>
+              <a:ext uri="{FF2B5EF4-FFF2-40B4-BE49-F238E27FC236}">
+                <a16:creationId xmlns:a16="http://schemas.microsoft.com/office/drawing/2014/main" id="{F2C0577B-B6A2-7F42-95B0-F9AC3D421519}"/>
+              </a:ext>
+            </a:extLst>
+          </p:cNvPr>
+          <p:cNvSpPr txBox="1"/>
+          <p:nvPr/>
+        </p:nvSpPr>
+        <p:spPr>
+          <a:xfrm>
+            <a:off x="5597697" y="2298338"/>
+            <a:ext cx="1269794" cy="523220"/>
+          </a:xfrm>
+          <a:prstGeom prst="rect">
+            <a:avLst/>
+          </a:prstGeom>
+          <a:noFill/>
+        </p:spPr>
+        <p:txBody>
+          <a:bodyPr wrap="square" rtlCol="0">
+            <a:spAutoFit/>
+          </a:bodyPr>
+          <a:lstStyle/>
+          <a:p>
+            <a:pPr algn="ctr"/>
+            <a:r>
+              <a:rPr lang="en-US" sz="1400" dirty="0" err="1">
+                <a:latin typeface="Arial" panose="020B0604020202020204" pitchFamily="34" charset="0"/>
+                <a:ea typeface="Amazon Ember" panose="020B0603020204020204" pitchFamily="34" charset="0"/>
+                <a:cs typeface="Arial" panose="020B0604020202020204" pitchFamily="34" charset="0"/>
+              </a:rPr>
+              <a:t>CodeBuild</a:t>
+            </a:r>
+            <a:endParaRPr lang="en-US" sz="1400" dirty="0">
+              <a:latin typeface="Arial" panose="020B0604020202020204" pitchFamily="34" charset="0"/>
+              <a:ea typeface="Amazon Ember" panose="020B0603020204020204" pitchFamily="34" charset="0"/>
+              <a:cs typeface="Arial" panose="020B0604020202020204" pitchFamily="34" charset="0"/>
+            </a:endParaRPr>
+          </a:p>
+          <a:p>
+            <a:pPr algn="ctr"/>
+            <a:r>
+              <a:rPr lang="en-US" sz="1400" dirty="0">
+                <a:latin typeface="Arial" panose="020B0604020202020204" pitchFamily="34" charset="0"/>
+                <a:ea typeface="Amazon Ember" panose="020B0603020204020204" pitchFamily="34" charset="0"/>
+                <a:cs typeface="Arial" panose="020B0604020202020204" pitchFamily="34" charset="0"/>
+              </a:rPr>
+              <a:t>SAM Deploy</a:t>
+            </a:r>
+          </a:p>
+        </p:txBody>
+      </p:sp>
+      <p:sp>
+        <p:nvSpPr>
+          <p:cNvPr id="18" name="TextBox 17">
+            <a:extLst>
+              <a:ext uri="{FF2B5EF4-FFF2-40B4-BE49-F238E27FC236}">
+                <a16:creationId xmlns:a16="http://schemas.microsoft.com/office/drawing/2014/main" id="{36628813-EEFA-6345-B6C8-6B39667182A7}"/>
+              </a:ext>
+            </a:extLst>
+          </p:cNvPr>
+          <p:cNvSpPr txBox="1"/>
+          <p:nvPr/>
+        </p:nvSpPr>
+        <p:spPr>
+          <a:xfrm>
+            <a:off x="8988784" y="1484641"/>
+            <a:ext cx="952550" cy="523220"/>
+          </a:xfrm>
+          <a:prstGeom prst="rect">
+            <a:avLst/>
+          </a:prstGeom>
+          <a:noFill/>
+        </p:spPr>
+        <p:txBody>
+          <a:bodyPr wrap="square" rtlCol="0">
+            <a:spAutoFit/>
+          </a:bodyPr>
+          <a:lstStyle/>
+          <a:p>
+            <a:pPr algn="ctr"/>
+            <a:r>
+              <a:rPr lang="en-US" sz="1400" dirty="0">
+                <a:latin typeface="Arial" panose="020B0604020202020204" pitchFamily="34" charset="0"/>
+                <a:ea typeface="Amazon Ember" panose="020B0603020204020204" pitchFamily="34" charset="0"/>
+                <a:cs typeface="Arial" panose="020B0604020202020204" pitchFamily="34" charset="0"/>
+              </a:rPr>
+              <a:t>API Gateway</a:t>
+            </a:r>
+          </a:p>
+        </p:txBody>
+      </p:sp>
+      <p:sp>
+        <p:nvSpPr>
+          <p:cNvPr id="19" name="TextBox 18">
+            <a:extLst>
+              <a:ext uri="{FF2B5EF4-FFF2-40B4-BE49-F238E27FC236}">
+                <a16:creationId xmlns:a16="http://schemas.microsoft.com/office/drawing/2014/main" id="{AF44D635-DD13-C84C-BF5B-700B2611883D}"/>
+              </a:ext>
+            </a:extLst>
+          </p:cNvPr>
+          <p:cNvSpPr txBox="1"/>
+          <p:nvPr/>
+        </p:nvSpPr>
+        <p:spPr>
+          <a:xfrm>
+            <a:off x="8988784" y="4340564"/>
+            <a:ext cx="952550" cy="523220"/>
+          </a:xfrm>
+          <a:prstGeom prst="rect">
+            <a:avLst/>
+          </a:prstGeom>
+          <a:noFill/>
+        </p:spPr>
+        <p:txBody>
+          <a:bodyPr wrap="square" rtlCol="0">
+            <a:spAutoFit/>
+          </a:bodyPr>
+          <a:lstStyle/>
+          <a:p>
+            <a:pPr algn="ctr"/>
+            <a:r>
+              <a:rPr lang="en-US" sz="1400" dirty="0">
+                <a:latin typeface="Arial" panose="020B0604020202020204" pitchFamily="34" charset="0"/>
+                <a:ea typeface="Amazon Ember" panose="020B0603020204020204" pitchFamily="34" charset="0"/>
+                <a:cs typeface="Arial" panose="020B0604020202020204" pitchFamily="34" charset="0"/>
+              </a:rPr>
+              <a:t>Lambda Function</a:t>
+            </a:r>
+          </a:p>
+        </p:txBody>
+      </p:sp>
+      <p:pic>
+        <p:nvPicPr>
+          <p:cNvPr id="25" name="Picture 24">
+            <a:extLst>
+              <a:ext uri="{FF2B5EF4-FFF2-40B4-BE49-F238E27FC236}">
+                <a16:creationId xmlns:a16="http://schemas.microsoft.com/office/drawing/2014/main" id="{7D92B999-0E4E-284F-AC7D-3954E485EADB}"/>
+              </a:ext>
+            </a:extLst>
+          </p:cNvPr>
+          <p:cNvPicPr>
+            <a:picLocks noChangeAspect="1"/>
+          </p:cNvPicPr>
+          <p:nvPr/>
+        </p:nvPicPr>
+        <p:blipFill>
+          <a:blip r:embed="rId8">
+            <a:extLst>
+              <a:ext uri="{28A0092B-C50C-407E-A947-70E740481C1C}">
+                <a14:useLocalDpi xmlns:a14="http://schemas.microsoft.com/office/drawing/2010/main" val="0"/>
+              </a:ext>
+            </a:extLst>
+          </a:blip>
+          <a:stretch>
+            <a:fillRect/>
+          </a:stretch>
+        </p:blipFill>
+        <p:spPr>
+          <a:xfrm>
+            <a:off x="7818580" y="2881184"/>
+            <a:ext cx="594360" cy="594360"/>
+          </a:xfrm>
+          <a:prstGeom prst="rect">
+            <a:avLst/>
+          </a:prstGeom>
+        </p:spPr>
+      </p:pic>
+      <p:sp>
+        <p:nvSpPr>
+          <p:cNvPr id="26" name="TextBox 25">
+            <a:extLst>
+              <a:ext uri="{FF2B5EF4-FFF2-40B4-BE49-F238E27FC236}">
+                <a16:creationId xmlns:a16="http://schemas.microsoft.com/office/drawing/2014/main" id="{98FF08B6-15AE-7442-8B9D-9D79650859EF}"/>
+              </a:ext>
+            </a:extLst>
+          </p:cNvPr>
+          <p:cNvSpPr txBox="1"/>
+          <p:nvPr/>
+        </p:nvSpPr>
+        <p:spPr>
+          <a:xfrm>
+            <a:off x="7305683" y="2508021"/>
+            <a:ext cx="1620154" cy="307777"/>
+          </a:xfrm>
+          <a:prstGeom prst="rect">
+            <a:avLst/>
+          </a:prstGeom>
+          <a:noFill/>
+        </p:spPr>
+        <p:txBody>
+          <a:bodyPr wrap="square" rtlCol="0">
+            <a:spAutoFit/>
+          </a:bodyPr>
+          <a:lstStyle/>
+          <a:p>
+            <a:pPr algn="ctr"/>
+            <a:r>
+              <a:rPr lang="en-US" sz="1400" dirty="0">
+                <a:latin typeface="Arial" panose="020B0604020202020204" pitchFamily="34" charset="0"/>
+                <a:ea typeface="Amazon Ember" panose="020B0603020204020204" pitchFamily="34" charset="0"/>
+                <a:cs typeface="Arial" panose="020B0604020202020204" pitchFamily="34" charset="0"/>
+              </a:rPr>
+              <a:t>CloudFormation</a:t>
+            </a:r>
+          </a:p>
+        </p:txBody>
+      </p:sp>
+      <p:sp>
+        <p:nvSpPr>
+          <p:cNvPr id="29" name="Rectangle 28">
+            <a:extLst>
+              <a:ext uri="{FF2B5EF4-FFF2-40B4-BE49-F238E27FC236}">
+                <a16:creationId xmlns:a16="http://schemas.microsoft.com/office/drawing/2014/main" id="{863B7578-14C3-FB4D-B01A-0D5DFEFD4A37}"/>
+              </a:ext>
+            </a:extLst>
+          </p:cNvPr>
+          <p:cNvSpPr/>
+          <p:nvPr/>
+        </p:nvSpPr>
+        <p:spPr>
+          <a:xfrm>
+            <a:off x="2076127" y="825790"/>
+            <a:ext cx="8039746" cy="4846590"/>
+          </a:xfrm>
+          <a:prstGeom prst="rect">
+            <a:avLst/>
+          </a:prstGeom>
+          <a:noFill/>
+          <a:ln>
+            <a:solidFill>
+              <a:schemeClr val="tx1"/>
+            </a:solidFill>
+          </a:ln>
+        </p:spPr>
+        <p:style>
+          <a:lnRef idx="2">
+            <a:schemeClr val="accent1">
+              <a:shade val="50000"/>
+            </a:schemeClr>
+          </a:lnRef>
+          <a:fillRef idx="1">
+            <a:schemeClr val="accent1"/>
+          </a:fillRef>
+          <a:effectRef idx="0">
+            <a:schemeClr val="accent1"/>
+          </a:effectRef>
+          <a:fontRef idx="minor">
+            <a:schemeClr val="lt1"/>
+          </a:fontRef>
+        </p:style>
+        <p:txBody>
+          <a:bodyPr rtlCol="0" anchor="ctr"/>
+          <a:lstStyle/>
+          <a:p>
+            <a:pPr algn="ctr"/>
+            <a:endParaRPr lang="en-US"/>
+          </a:p>
+        </p:txBody>
+      </p:sp>
       <p:pic>
         <p:nvPicPr>
           <p:cNvPr id="30" name="Picture 29">
@@ -4452,7 +4118,7 @@
         </p:blipFill>
         <p:spPr>
           <a:xfrm>
-            <a:off x="685880" y="780327"/>
+            <a:off x="2076207" y="826822"/>
             <a:ext cx="444500" cy="444500"/>
           </a:xfrm>
           <a:prstGeom prst="rect">
@@ -4474,8 +4140,8 @@
         </p:nvSpPr>
         <p:spPr>
           <a:xfrm>
-            <a:off x="1159042" y="814379"/>
-            <a:ext cx="1348447" cy="369332"/>
+            <a:off x="2737370" y="860874"/>
+            <a:ext cx="972446" cy="276999"/>
           </a:xfrm>
           <a:prstGeom prst="rect">
             <a:avLst/>
@@ -4490,16 +4156,146 @@
           <a:p>
             <a:pPr algn="ctr"/>
             <a:r>
-              <a:rPr lang="en-US" dirty="0">
-                <a:latin typeface="Amazon Ember" panose="020B0603020204020204" pitchFamily="34" charset="0"/>
+              <a:rPr lang="en-US" sz="1200" dirty="0">
+                <a:latin typeface="Arial" panose="020B0604020202020204" pitchFamily="34" charset="0"/>
                 <a:ea typeface="Amazon Ember" panose="020B0603020204020204" pitchFamily="34" charset="0"/>
-                <a:cs typeface="Amazon Ember" panose="020B0603020204020204" pitchFamily="34" charset="0"/>
+                <a:cs typeface="Arial" panose="020B0604020202020204" pitchFamily="34" charset="0"/>
               </a:rPr>
               <a:t>AWS Cloud</a:t>
             </a:r>
           </a:p>
         </p:txBody>
       </p:sp>
+      <p:pic>
+        <p:nvPicPr>
+          <p:cNvPr id="32" name="Picture 31">
+            <a:extLst>
+              <a:ext uri="{FF2B5EF4-FFF2-40B4-BE49-F238E27FC236}">
+                <a16:creationId xmlns:a16="http://schemas.microsoft.com/office/drawing/2014/main" id="{5D2ECD7B-6AEB-7243-A7E6-F8120520F713}"/>
+              </a:ext>
+            </a:extLst>
+          </p:cNvPr>
+          <p:cNvPicPr>
+            <a:picLocks noChangeAspect="1"/>
+          </p:cNvPicPr>
+          <p:nvPr/>
+        </p:nvPicPr>
+        <p:blipFill>
+          <a:blip r:embed="rId2" cstate="print">
+            <a:extLst>
+              <a:ext uri="{28A0092B-C50C-407E-A947-70E740481C1C}">
+                <a14:useLocalDpi xmlns:a14="http://schemas.microsoft.com/office/drawing/2010/main" val="0"/>
+              </a:ext>
+            </a:extLst>
+          </a:blip>
+          <a:stretch>
+            <a:fillRect/>
+          </a:stretch>
+        </p:blipFill>
+        <p:spPr>
+          <a:xfrm>
+            <a:off x="4469205" y="2852483"/>
+            <a:ext cx="594360" cy="594360"/>
+          </a:xfrm>
+          <a:prstGeom prst="rect">
+            <a:avLst/>
+          </a:prstGeom>
+        </p:spPr>
+      </p:pic>
+      <p:cxnSp>
+        <p:nvCxnSpPr>
+          <p:cNvPr id="33" name="Straight Arrow Connector 32">
+            <a:extLst>
+              <a:ext uri="{FF2B5EF4-FFF2-40B4-BE49-F238E27FC236}">
+                <a16:creationId xmlns:a16="http://schemas.microsoft.com/office/drawing/2014/main" id="{6C0A2149-9E16-A446-B49B-3583A20D56AD}"/>
+              </a:ext>
+            </a:extLst>
+          </p:cNvPr>
+          <p:cNvCxnSpPr>
+            <a:cxnSpLocks/>
+            <a:stCxn id="9" idx="3"/>
+            <a:endCxn id="25" idx="1"/>
+          </p:cNvCxnSpPr>
+          <p:nvPr/>
+        </p:nvCxnSpPr>
+        <p:spPr>
+          <a:xfrm>
+            <a:off x="6529774" y="3178315"/>
+            <a:ext cx="1288806" cy="49"/>
+          </a:xfrm>
+          <a:prstGeom prst="straightConnector1">
+            <a:avLst/>
+          </a:prstGeom>
+          <a:ln w="12700">
+            <a:solidFill>
+              <a:srgbClr val="545B64"/>
+            </a:solidFill>
+            <a:headEnd type="none" w="med" len="sm"/>
+            <a:tailEnd type="arrow" w="med" len="sm"/>
+          </a:ln>
+        </p:spPr>
+        <p:style>
+          <a:lnRef idx="1">
+            <a:schemeClr val="accent1"/>
+          </a:lnRef>
+          <a:fillRef idx="0">
+            <a:schemeClr val="accent1"/>
+          </a:fillRef>
+          <a:effectRef idx="0">
+            <a:schemeClr val="accent1"/>
+          </a:effectRef>
+          <a:fontRef idx="minor">
+            <a:schemeClr val="tx1"/>
+          </a:fontRef>
+        </p:style>
+      </p:cxnSp>
+      <p:cxnSp>
+        <p:nvCxnSpPr>
+          <p:cNvPr id="34" name="Straight Arrow Connector 33">
+            <a:extLst>
+              <a:ext uri="{FF2B5EF4-FFF2-40B4-BE49-F238E27FC236}">
+                <a16:creationId xmlns:a16="http://schemas.microsoft.com/office/drawing/2014/main" id="{2046A56E-0AB9-F942-B0EA-E7B913A8826E}"/>
+              </a:ext>
+            </a:extLst>
+          </p:cNvPr>
+          <p:cNvCxnSpPr>
+            <a:cxnSpLocks/>
+            <a:stCxn id="8" idx="2"/>
+            <a:endCxn id="7" idx="0"/>
+          </p:cNvCxnSpPr>
+          <p:nvPr/>
+        </p:nvCxnSpPr>
+        <p:spPr>
+          <a:xfrm>
+            <a:off x="9465059" y="2632575"/>
+            <a:ext cx="0" cy="1113629"/>
+          </a:xfrm>
+          <a:prstGeom prst="straightConnector1">
+            <a:avLst/>
+          </a:prstGeom>
+          <a:ln w="12700">
+            <a:solidFill>
+              <a:srgbClr val="545B64"/>
+            </a:solidFill>
+            <a:headEnd type="none" w="med" len="sm"/>
+            <a:tailEnd type="arrow" w="med" len="sm"/>
+          </a:ln>
+        </p:spPr>
+        <p:style>
+          <a:lnRef idx="1">
+            <a:schemeClr val="accent1"/>
+          </a:lnRef>
+          <a:fillRef idx="0">
+            <a:schemeClr val="accent1"/>
+          </a:fillRef>
+          <a:effectRef idx="0">
+            <a:schemeClr val="accent1"/>
+          </a:effectRef>
+          <a:fontRef idx="minor">
+            <a:schemeClr val="tx1"/>
+          </a:fontRef>
+        </p:style>
+      </p:cxnSp>
     </p:spTree>
     <p:extLst>
       <p:ext uri="{BB962C8B-B14F-4D97-AF65-F5344CB8AC3E}">

</xml_diff>